<commit_message>
added unit valie stream maps
</commit_message>
<xml_diff>
--- a/img/devops.09.pptx
+++ b/img/devops.09.pptx
@@ -3731,7 +3731,7 @@
           <p:nvPr>
             <p:extLst>
               <p:ext uri="{D42A27DB-BD31-4B8C-83A1-F6EECF244321}">
-                <p14:modId xmlns:p14="http://schemas.microsoft.com/office/powerpoint/2010/main" val="1462058082"/>
+                <p14:modId xmlns:p14="http://schemas.microsoft.com/office/powerpoint/2010/main" val="2856697586"/>
               </p:ext>
             </p:extLst>
           </p:nvPr>
@@ -3763,7 +3763,7 @@
                     <a:p>
                       <a:r>
                         <a:rPr lang="de-DE" dirty="0"/>
-                        <a:t>Orchestrierung</a:t>
+                        <a:t>Provisionierung</a:t>
                       </a:r>
                     </a:p>
                   </a:txBody>

</xml_diff>